<commit_message>
rename glossary in the whole page
- platform > vee port (except PCAs)
- firmware > executable
- remove MicroEJ prefix

Also update schematics
</commit_message>
<xml_diff>
--- a/VEEPortingGuide/images/testsuite-engine-overview.pptx
+++ b/VEEPortingGuide/images/testsuite-engine-overview.pptx
@@ -234,7 +234,7 @@
               <a:rPr lang="fr-FR" smtClean="0">
                 <a:latin typeface="Calibri Regular" charset="0"/>
               </a:rPr>
-              <a:t>07/10/2020</a:t>
+              <a:t>22/09/2023</a:t>
             </a:fld>
             <a:endParaRPr lang="en-US" dirty="0">
               <a:latin typeface="Calibri Regular" charset="0"/>
@@ -422,7 +422,7 @@
           <a:p>
             <a:fld id="{D125E8DA-58CB-F841-A404-E11EC1E2C988}" type="datetime1">
               <a:rPr lang="fr-FR" smtClean="0"/>
-              <a:t>07/10/2020</a:t>
+              <a:t>22/09/2023</a:t>
             </a:fld>
             <a:endParaRPr lang="en-US" dirty="0"/>
           </a:p>
@@ -4495,7 +4495,7 @@
           <a:p>
             <a:fld id="{198ED07F-DFCB-4ABE-A311-845A3D30E5DB}" type="datetime7">
               <a:rPr lang="en-US" smtClean="0"/>
-              <a:t>Oct-20</a:t>
+              <a:t>Sep-23</a:t>
             </a:fld>
             <a:endParaRPr lang="en-US" dirty="0"/>
           </a:p>
@@ -32696,7 +32696,7 @@
                 <a:buClrTx/>
               </a:pPr>
               <a:r>
-                <a:rPr lang="en-US" sz="1600">
+                <a:rPr lang="en-US" sz="1600" dirty="0">
                   <a:solidFill>
                     <a:schemeClr val="tx1">
                       <a:lumMod val="75000"/>
@@ -32706,18 +32706,8 @@
                   <a:ea typeface="Source Sans Pro Light" charset="0"/>
                   <a:cs typeface="Source Sans Pro Light" charset="0"/>
                 </a:rPr>
-                <a:t>Build report</a:t>
+                <a:t>Get Test Suite report</a:t>
               </a:r>
-              <a:endParaRPr lang="en-US" sz="1600" dirty="0">
-                <a:solidFill>
-                  <a:schemeClr val="tx1">
-                    <a:lumMod val="75000"/>
-                  </a:schemeClr>
-                </a:solidFill>
-                <a:latin typeface="Source Sans Pro Light" charset="0"/>
-                <a:ea typeface="Source Sans Pro Light" charset="0"/>
-                <a:cs typeface="Source Sans Pro Light" charset="0"/>
-              </a:endParaRPr>
             </a:p>
           </p:txBody>
         </p:sp>
@@ -35938,17 +35928,6 @@
                 <a:defRPr/>
               </a:pPr>
               <a:r>
-                <a:rPr lang="en-US" sz="1000" b="1" dirty="0" err="1">
-                  <a:solidFill>
-                    <a:srgbClr val="FFFFFF"/>
-                  </a:solidFill>
-                  <a:latin typeface="Source Sans Pro Light" charset="0"/>
-                  <a:ea typeface="Source Sans Pro Light" charset="0"/>
-                  <a:cs typeface="Source Sans Pro Light" charset="0"/>
-                </a:rPr>
-                <a:t>MicroEJ</a:t>
-              </a:r>
-              <a:r>
                 <a:rPr lang="en-US" sz="1000" b="1" dirty="0">
                   <a:solidFill>
                     <a:srgbClr val="FFFFFF"/>
@@ -35957,7 +35936,7 @@
                   <a:ea typeface="Source Sans Pro Light" charset="0"/>
                   <a:cs typeface="Source Sans Pro Light" charset="0"/>
                 </a:rPr>
-                <a:t> Platform</a:t>
+                <a:t>VEE Port</a:t>
               </a:r>
             </a:p>
           </p:txBody>
@@ -36404,10 +36383,10 @@
           </p:nvGrpSpPr>
           <p:grpSpPr>
             <a:xfrm>
-              <a:off x="8765540" y="1279621"/>
-              <a:ext cx="2947083" cy="2221387"/>
-              <a:chOff x="8765540" y="1279621"/>
-              <a:chExt cx="2947083" cy="2221387"/>
+              <a:off x="8765540" y="1439083"/>
+              <a:ext cx="2947083" cy="2061925"/>
+              <a:chOff x="8765540" y="1439083"/>
+              <a:chExt cx="2947083" cy="2061925"/>
             </a:xfrm>
           </p:grpSpPr>
           <p:sp>
@@ -36516,65 +36495,6 @@
               </a:prstGeom>
             </p:spPr>
           </p:pic>
-          <p:sp>
-            <p:nvSpPr>
-              <p:cNvPr id="37" name="TextBox 36">
-                <a:extLst>
-                  <a:ext uri="{FF2B5EF4-FFF2-40B4-BE49-F238E27FC236}">
-                    <a16:creationId xmlns:a16="http://schemas.microsoft.com/office/drawing/2014/main" id="{1E64CFE5-D560-40A1-83B1-3C39217DEF63}"/>
-                  </a:ext>
-                </a:extLst>
-              </p:cNvPr>
-              <p:cNvSpPr txBox="1"/>
-              <p:nvPr/>
-            </p:nvSpPr>
-            <p:spPr>
-              <a:xfrm>
-                <a:off x="9636011" y="1279621"/>
-                <a:ext cx="1203761" cy="318924"/>
-              </a:xfrm>
-              <a:prstGeom prst="rect">
-                <a:avLst/>
-              </a:prstGeom>
-              <a:solidFill>
-                <a:schemeClr val="bg1"/>
-              </a:solidFill>
-            </p:spPr>
-            <p:txBody>
-              <a:bodyPr wrap="square" tIns="36000" bIns="36000" rtlCol="0">
-                <a:spAutoFit/>
-              </a:bodyPr>
-              <a:lstStyle/>
-              <a:p>
-                <a:pPr algn="ctr" defTabSz="685783">
-                  <a:buClrTx/>
-                </a:pPr>
-                <a:r>
-                  <a:rPr lang="en-US" sz="1600">
-                    <a:solidFill>
-                      <a:schemeClr val="tx1">
-                        <a:lumMod val="75000"/>
-                      </a:schemeClr>
-                    </a:solidFill>
-                    <a:latin typeface="Source Sans Pro Light" charset="0"/>
-                    <a:ea typeface="Source Sans Pro Light" charset="0"/>
-                    <a:cs typeface="Source Sans Pro Light" charset="0"/>
-                  </a:rPr>
-                  <a:t>Test Report</a:t>
-                </a:r>
-                <a:endParaRPr lang="en-US" sz="1600" dirty="0">
-                  <a:solidFill>
-                    <a:schemeClr val="tx1">
-                      <a:lumMod val="75000"/>
-                    </a:schemeClr>
-                  </a:solidFill>
-                  <a:latin typeface="Source Sans Pro Light" charset="0"/>
-                  <a:ea typeface="Source Sans Pro Light" charset="0"/>
-                  <a:cs typeface="Source Sans Pro Light" charset="0"/>
-                </a:endParaRPr>
-              </a:p>
-            </p:txBody>
-          </p:sp>
         </p:grpSp>
         <p:grpSp>
           <p:nvGrpSpPr>

</xml_diff>